<commit_message>
Inserindo prototipação de tela (Login & Cadastro)
</commit_message>
<xml_diff>
--- a/Pesquisa e Inovação/Prototipação/Prototipação_OnePage.pptx
+++ b/Pesquisa e Inovação/Prototipação/Prototipação_OnePage.pptx
@@ -10,6 +10,8 @@
     <p:sldId id="259" r:id="rId4"/>
     <p:sldId id="262" r:id="rId5"/>
     <p:sldId id="263" r:id="rId6"/>
+    <p:sldId id="264" r:id="rId7"/>
+    <p:sldId id="265" r:id="rId8"/>
   </p:sldIdLst>
   <p:sldSz cx="12192000" cy="6858000"/>
   <p:notesSz cx="6858000" cy="9144000"/>
@@ -108,6 +110,11 @@
       </a:defRPr>
     </a:lvl9pPr>
   </p:defaultTextStyle>
+  <p:extLst>
+    <p:ext uri="{EFAFB233-063F-42B5-8137-9DF3F51BA10A}">
+      <p15:sldGuideLst xmlns:p15="http://schemas.microsoft.com/office/powerpoint/2012/main"/>
+    </p:ext>
+  </p:extLst>
 </p:presentation>
 </file>
 
@@ -258,7 +265,7 @@
           <a:p>
             <a:fld id="{33F98B33-E353-4E9F-B9AC-EAD13F7192D8}" type="datetimeFigureOut">
               <a:rPr lang="pt-BR" smtClean="0"/>
-              <a:t>27/08/2021</a:t>
+              <a:t>02/09/2021</a:t>
             </a:fld>
             <a:endParaRPr lang="pt-BR"/>
           </a:p>
@@ -456,7 +463,7 @@
           <a:p>
             <a:fld id="{33F98B33-E353-4E9F-B9AC-EAD13F7192D8}" type="datetimeFigureOut">
               <a:rPr lang="pt-BR" smtClean="0"/>
-              <a:t>27/08/2021</a:t>
+              <a:t>02/09/2021</a:t>
             </a:fld>
             <a:endParaRPr lang="pt-BR"/>
           </a:p>
@@ -664,7 +671,7 @@
           <a:p>
             <a:fld id="{33F98B33-E353-4E9F-B9AC-EAD13F7192D8}" type="datetimeFigureOut">
               <a:rPr lang="pt-BR" smtClean="0"/>
-              <a:t>27/08/2021</a:t>
+              <a:t>02/09/2021</a:t>
             </a:fld>
             <a:endParaRPr lang="pt-BR"/>
           </a:p>
@@ -862,7 +869,7 @@
           <a:p>
             <a:fld id="{33F98B33-E353-4E9F-B9AC-EAD13F7192D8}" type="datetimeFigureOut">
               <a:rPr lang="pt-BR" smtClean="0"/>
-              <a:t>27/08/2021</a:t>
+              <a:t>02/09/2021</a:t>
             </a:fld>
             <a:endParaRPr lang="pt-BR"/>
           </a:p>
@@ -1137,7 +1144,7 @@
           <a:p>
             <a:fld id="{33F98B33-E353-4E9F-B9AC-EAD13F7192D8}" type="datetimeFigureOut">
               <a:rPr lang="pt-BR" smtClean="0"/>
-              <a:t>27/08/2021</a:t>
+              <a:t>02/09/2021</a:t>
             </a:fld>
             <a:endParaRPr lang="pt-BR"/>
           </a:p>
@@ -1402,7 +1409,7 @@
           <a:p>
             <a:fld id="{33F98B33-E353-4E9F-B9AC-EAD13F7192D8}" type="datetimeFigureOut">
               <a:rPr lang="pt-BR" smtClean="0"/>
-              <a:t>27/08/2021</a:t>
+              <a:t>02/09/2021</a:t>
             </a:fld>
             <a:endParaRPr lang="pt-BR"/>
           </a:p>
@@ -1814,7 +1821,7 @@
           <a:p>
             <a:fld id="{33F98B33-E353-4E9F-B9AC-EAD13F7192D8}" type="datetimeFigureOut">
               <a:rPr lang="pt-BR" smtClean="0"/>
-              <a:t>27/08/2021</a:t>
+              <a:t>02/09/2021</a:t>
             </a:fld>
             <a:endParaRPr lang="pt-BR"/>
           </a:p>
@@ -1955,7 +1962,7 @@
           <a:p>
             <a:fld id="{33F98B33-E353-4E9F-B9AC-EAD13F7192D8}" type="datetimeFigureOut">
               <a:rPr lang="pt-BR" smtClean="0"/>
-              <a:t>27/08/2021</a:t>
+              <a:t>02/09/2021</a:t>
             </a:fld>
             <a:endParaRPr lang="pt-BR"/>
           </a:p>
@@ -2068,7 +2075,7 @@
           <a:p>
             <a:fld id="{33F98B33-E353-4E9F-B9AC-EAD13F7192D8}" type="datetimeFigureOut">
               <a:rPr lang="pt-BR" smtClean="0"/>
-              <a:t>27/08/2021</a:t>
+              <a:t>02/09/2021</a:t>
             </a:fld>
             <a:endParaRPr lang="pt-BR"/>
           </a:p>
@@ -2379,7 +2386,7 @@
           <a:p>
             <a:fld id="{33F98B33-E353-4E9F-B9AC-EAD13F7192D8}" type="datetimeFigureOut">
               <a:rPr lang="pt-BR" smtClean="0"/>
-              <a:t>27/08/2021</a:t>
+              <a:t>02/09/2021</a:t>
             </a:fld>
             <a:endParaRPr lang="pt-BR"/>
           </a:p>
@@ -2667,7 +2674,7 @@
           <a:p>
             <a:fld id="{33F98B33-E353-4E9F-B9AC-EAD13F7192D8}" type="datetimeFigureOut">
               <a:rPr lang="pt-BR" smtClean="0"/>
-              <a:t>27/08/2021</a:t>
+              <a:t>02/09/2021</a:t>
             </a:fld>
             <a:endParaRPr lang="pt-BR"/>
           </a:p>
@@ -2908,7 +2915,7 @@
           <a:p>
             <a:fld id="{33F98B33-E353-4E9F-B9AC-EAD13F7192D8}" type="datetimeFigureOut">
               <a:rPr lang="pt-BR" smtClean="0"/>
-              <a:t>27/08/2021</a:t>
+              <a:t>02/09/2021</a:t>
             </a:fld>
             <a:endParaRPr lang="pt-BR"/>
           </a:p>
@@ -3608,6 +3615,126 @@
 </p:sld>
 </file>
 
+<file path=ppt/slides/slide6.xml><?xml version="1.0" encoding="utf-8"?>
+<p:sld xmlns:a="http://schemas.openxmlformats.org/drawingml/2006/main" xmlns:r="http://schemas.openxmlformats.org/officeDocument/2006/relationships" xmlns:p="http://schemas.openxmlformats.org/presentationml/2006/main">
+  <p:cSld>
+    <p:spTree>
+      <p:nvGrpSpPr>
+        <p:cNvPr id="1" name=""/>
+        <p:cNvGrpSpPr/>
+        <p:nvPr/>
+      </p:nvGrpSpPr>
+      <p:grpSpPr>
+        <a:xfrm>
+          <a:off x="0" y="0"/>
+          <a:ext cx="0" cy="0"/>
+          <a:chOff x="0" y="0"/>
+          <a:chExt cx="0" cy="0"/>
+        </a:xfrm>
+      </p:grpSpPr>
+      <p:pic>
+        <p:nvPicPr>
+          <p:cNvPr id="4" name="Imagem 3">
+            <a:extLst>
+              <a:ext uri="{FF2B5EF4-FFF2-40B4-BE49-F238E27FC236}">
+                <a16:creationId xmlns:a16="http://schemas.microsoft.com/office/drawing/2014/main" id="{4D6A7873-8BEF-4A12-93B9-27640AA20307}"/>
+              </a:ext>
+            </a:extLst>
+          </p:cNvPr>
+          <p:cNvPicPr>
+            <a:picLocks noChangeAspect="1"/>
+          </p:cNvPicPr>
+          <p:nvPr/>
+        </p:nvPicPr>
+        <p:blipFill>
+          <a:blip r:embed="rId2"/>
+          <a:stretch>
+            <a:fillRect/>
+          </a:stretch>
+        </p:blipFill>
+        <p:spPr>
+          <a:xfrm>
+            <a:off x="0" y="0"/>
+            <a:ext cx="12205877" cy="6858000"/>
+          </a:xfrm>
+          <a:prstGeom prst="rect">
+            <a:avLst/>
+          </a:prstGeom>
+        </p:spPr>
+      </p:pic>
+    </p:spTree>
+    <p:extLst>
+      <p:ext uri="{BB962C8B-B14F-4D97-AF65-F5344CB8AC3E}">
+        <p14:creationId xmlns:p14="http://schemas.microsoft.com/office/powerpoint/2010/main" val="3770045600"/>
+      </p:ext>
+    </p:extLst>
+  </p:cSld>
+  <p:clrMapOvr>
+    <a:masterClrMapping/>
+  </p:clrMapOvr>
+</p:sld>
+</file>
+
+<file path=ppt/slides/slide7.xml><?xml version="1.0" encoding="utf-8"?>
+<p:sld xmlns:a="http://schemas.openxmlformats.org/drawingml/2006/main" xmlns:r="http://schemas.openxmlformats.org/officeDocument/2006/relationships" xmlns:p="http://schemas.openxmlformats.org/presentationml/2006/main">
+  <p:cSld>
+    <p:spTree>
+      <p:nvGrpSpPr>
+        <p:cNvPr id="1" name=""/>
+        <p:cNvGrpSpPr/>
+        <p:nvPr/>
+      </p:nvGrpSpPr>
+      <p:grpSpPr>
+        <a:xfrm>
+          <a:off x="0" y="0"/>
+          <a:ext cx="0" cy="0"/>
+          <a:chOff x="0" y="0"/>
+          <a:chExt cx="0" cy="0"/>
+        </a:xfrm>
+      </p:grpSpPr>
+      <p:pic>
+        <p:nvPicPr>
+          <p:cNvPr id="3" name="Imagem 2">
+            <a:extLst>
+              <a:ext uri="{FF2B5EF4-FFF2-40B4-BE49-F238E27FC236}">
+                <a16:creationId xmlns:a16="http://schemas.microsoft.com/office/drawing/2014/main" id="{430C2CB3-F2E9-4206-92E1-F7135DBDF4F1}"/>
+              </a:ext>
+            </a:extLst>
+          </p:cNvPr>
+          <p:cNvPicPr>
+            <a:picLocks noChangeAspect="1"/>
+          </p:cNvPicPr>
+          <p:nvPr/>
+        </p:nvPicPr>
+        <p:blipFill>
+          <a:blip r:embed="rId2"/>
+          <a:stretch>
+            <a:fillRect/>
+          </a:stretch>
+        </p:blipFill>
+        <p:spPr>
+          <a:xfrm>
+            <a:off x="0" y="0"/>
+            <a:ext cx="12192000" cy="6861544"/>
+          </a:xfrm>
+          <a:prstGeom prst="rect">
+            <a:avLst/>
+          </a:prstGeom>
+        </p:spPr>
+      </p:pic>
+    </p:spTree>
+    <p:extLst>
+      <p:ext uri="{BB962C8B-B14F-4D97-AF65-F5344CB8AC3E}">
+        <p14:creationId xmlns:p14="http://schemas.microsoft.com/office/powerpoint/2010/main" val="1064397206"/>
+      </p:ext>
+    </p:extLst>
+  </p:cSld>
+  <p:clrMapOvr>
+    <a:masterClrMapping/>
+  </p:clrMapOvr>
+</p:sld>
+</file>
+
 <file path=ppt/theme/theme1.xml><?xml version="1.0" encoding="utf-8"?>
 <a:theme xmlns:a="http://schemas.openxmlformats.org/drawingml/2006/main" name="Tema do Office">
   <a:themeElements>

</xml_diff>

<commit_message>
Alterando prototipação de tela
</commit_message>
<xml_diff>
--- a/Pesquisa e Inovação/Prototipação/Prototipação_OnePage.pptx
+++ b/Pesquisa e Inovação/Prototipação/Prototipação_OnePage.pptx
@@ -265,7 +265,7 @@
           <a:p>
             <a:fld id="{33F98B33-E353-4E9F-B9AC-EAD13F7192D8}" type="datetimeFigureOut">
               <a:rPr lang="pt-BR" smtClean="0"/>
-              <a:t>02/09/2021</a:t>
+              <a:t>21/09/2021</a:t>
             </a:fld>
             <a:endParaRPr lang="pt-BR"/>
           </a:p>
@@ -463,7 +463,7 @@
           <a:p>
             <a:fld id="{33F98B33-E353-4E9F-B9AC-EAD13F7192D8}" type="datetimeFigureOut">
               <a:rPr lang="pt-BR" smtClean="0"/>
-              <a:t>02/09/2021</a:t>
+              <a:t>21/09/2021</a:t>
             </a:fld>
             <a:endParaRPr lang="pt-BR"/>
           </a:p>
@@ -671,7 +671,7 @@
           <a:p>
             <a:fld id="{33F98B33-E353-4E9F-B9AC-EAD13F7192D8}" type="datetimeFigureOut">
               <a:rPr lang="pt-BR" smtClean="0"/>
-              <a:t>02/09/2021</a:t>
+              <a:t>21/09/2021</a:t>
             </a:fld>
             <a:endParaRPr lang="pt-BR"/>
           </a:p>
@@ -869,7 +869,7 @@
           <a:p>
             <a:fld id="{33F98B33-E353-4E9F-B9AC-EAD13F7192D8}" type="datetimeFigureOut">
               <a:rPr lang="pt-BR" smtClean="0"/>
-              <a:t>02/09/2021</a:t>
+              <a:t>21/09/2021</a:t>
             </a:fld>
             <a:endParaRPr lang="pt-BR"/>
           </a:p>
@@ -1144,7 +1144,7 @@
           <a:p>
             <a:fld id="{33F98B33-E353-4E9F-B9AC-EAD13F7192D8}" type="datetimeFigureOut">
               <a:rPr lang="pt-BR" smtClean="0"/>
-              <a:t>02/09/2021</a:t>
+              <a:t>21/09/2021</a:t>
             </a:fld>
             <a:endParaRPr lang="pt-BR"/>
           </a:p>
@@ -1409,7 +1409,7 @@
           <a:p>
             <a:fld id="{33F98B33-E353-4E9F-B9AC-EAD13F7192D8}" type="datetimeFigureOut">
               <a:rPr lang="pt-BR" smtClean="0"/>
-              <a:t>02/09/2021</a:t>
+              <a:t>21/09/2021</a:t>
             </a:fld>
             <a:endParaRPr lang="pt-BR"/>
           </a:p>
@@ -1821,7 +1821,7 @@
           <a:p>
             <a:fld id="{33F98B33-E353-4E9F-B9AC-EAD13F7192D8}" type="datetimeFigureOut">
               <a:rPr lang="pt-BR" smtClean="0"/>
-              <a:t>02/09/2021</a:t>
+              <a:t>21/09/2021</a:t>
             </a:fld>
             <a:endParaRPr lang="pt-BR"/>
           </a:p>
@@ -1962,7 +1962,7 @@
           <a:p>
             <a:fld id="{33F98B33-E353-4E9F-B9AC-EAD13F7192D8}" type="datetimeFigureOut">
               <a:rPr lang="pt-BR" smtClean="0"/>
-              <a:t>02/09/2021</a:t>
+              <a:t>21/09/2021</a:t>
             </a:fld>
             <a:endParaRPr lang="pt-BR"/>
           </a:p>
@@ -2075,7 +2075,7 @@
           <a:p>
             <a:fld id="{33F98B33-E353-4E9F-B9AC-EAD13F7192D8}" type="datetimeFigureOut">
               <a:rPr lang="pt-BR" smtClean="0"/>
-              <a:t>02/09/2021</a:t>
+              <a:t>21/09/2021</a:t>
             </a:fld>
             <a:endParaRPr lang="pt-BR"/>
           </a:p>
@@ -2386,7 +2386,7 @@
           <a:p>
             <a:fld id="{33F98B33-E353-4E9F-B9AC-EAD13F7192D8}" type="datetimeFigureOut">
               <a:rPr lang="pt-BR" smtClean="0"/>
-              <a:t>02/09/2021</a:t>
+              <a:t>21/09/2021</a:t>
             </a:fld>
             <a:endParaRPr lang="pt-BR"/>
           </a:p>
@@ -2674,7 +2674,7 @@
           <a:p>
             <a:fld id="{33F98B33-E353-4E9F-B9AC-EAD13F7192D8}" type="datetimeFigureOut">
               <a:rPr lang="pt-BR" smtClean="0"/>
-              <a:t>02/09/2021</a:t>
+              <a:t>21/09/2021</a:t>
             </a:fld>
             <a:endParaRPr lang="pt-BR"/>
           </a:p>
@@ -2915,7 +2915,7 @@
           <a:p>
             <a:fld id="{33F98B33-E353-4E9F-B9AC-EAD13F7192D8}" type="datetimeFigureOut">
               <a:rPr lang="pt-BR" smtClean="0"/>
-              <a:t>02/09/2021</a:t>
+              <a:t>21/09/2021</a:t>
             </a:fld>
             <a:endParaRPr lang="pt-BR"/>
           </a:p>
@@ -3574,10 +3574,10 @@
       </p:grpSpPr>
       <p:pic>
         <p:nvPicPr>
-          <p:cNvPr id="3" name="Imagem 2" descr="Interface gráfica do usuário, Aplicativo, Site&#10;&#10;Descrição gerada automaticamente">
-            <a:extLst>
-              <a:ext uri="{FF2B5EF4-FFF2-40B4-BE49-F238E27FC236}">
-                <a16:creationId xmlns:a16="http://schemas.microsoft.com/office/drawing/2014/main" id="{88E8BF9C-0ED3-4507-B62B-735EC2F548E2}"/>
+          <p:cNvPr id="4" name="Imagem 3">
+            <a:extLst>
+              <a:ext uri="{FF2B5EF4-FFF2-40B4-BE49-F238E27FC236}">
+                <a16:creationId xmlns:a16="http://schemas.microsoft.com/office/drawing/2014/main" id="{132B4569-229A-43B8-919B-4A3CAC3DA3FE}"/>
               </a:ext>
             </a:extLst>
           </p:cNvPr>
@@ -3595,7 +3595,7 @@
         <p:spPr>
           <a:xfrm>
             <a:off x="0" y="-1"/>
-            <a:ext cx="12192000" cy="6873083"/>
+            <a:ext cx="12192000" cy="6882581"/>
           </a:xfrm>
           <a:prstGeom prst="rect">
             <a:avLst/>
@@ -3694,10 +3694,10 @@
       </p:grpSpPr>
       <p:pic>
         <p:nvPicPr>
-          <p:cNvPr id="3" name="Imagem 2">
-            <a:extLst>
-              <a:ext uri="{FF2B5EF4-FFF2-40B4-BE49-F238E27FC236}">
-                <a16:creationId xmlns:a16="http://schemas.microsoft.com/office/drawing/2014/main" id="{430C2CB3-F2E9-4206-92E1-F7135DBDF4F1}"/>
+          <p:cNvPr id="4" name="Imagem 3">
+            <a:extLst>
+              <a:ext uri="{FF2B5EF4-FFF2-40B4-BE49-F238E27FC236}">
+                <a16:creationId xmlns:a16="http://schemas.microsoft.com/office/drawing/2014/main" id="{8AE16327-0542-41A3-A2B5-E4DD8B79EBD3}"/>
               </a:ext>
             </a:extLst>
           </p:cNvPr>
@@ -3714,8 +3714,8 @@
         </p:blipFill>
         <p:spPr>
           <a:xfrm>
-            <a:off x="0" y="0"/>
-            <a:ext cx="12192000" cy="6861544"/>
+            <a:off x="-1" y="0"/>
+            <a:ext cx="12245419" cy="6858000"/>
           </a:xfrm>
           <a:prstGeom prst="rect">
             <a:avLst/>

</xml_diff>